<commit_message>
Added linear regression exercise on diamond prices
</commit_message>
<xml_diff>
--- a/presentations/pptx/07-Linear_regression_methods.pptx
+++ b/presentations/pptx/07-Linear_regression_methods.pptx
@@ -5,7 +5,7 @@
     <p:sldMasterId id="2147483840" r:id="rId1"/>
   </p:sldMasterIdLst>
   <p:notesMasterIdLst>
-    <p:notesMasterId r:id="rId28"/>
+    <p:notesMasterId r:id="rId29"/>
   </p:notesMasterIdLst>
   <p:sldIdLst>
     <p:sldId id="256" r:id="rId2"/>
@@ -24,16 +24,17 @@
     <p:sldId id="275" r:id="rId15"/>
     <p:sldId id="267" r:id="rId16"/>
     <p:sldId id="272" r:id="rId17"/>
-    <p:sldId id="274" r:id="rId18"/>
-    <p:sldId id="269" r:id="rId19"/>
-    <p:sldId id="270" r:id="rId20"/>
-    <p:sldId id="282" r:id="rId21"/>
-    <p:sldId id="281" r:id="rId22"/>
-    <p:sldId id="261" r:id="rId23"/>
-    <p:sldId id="285" r:id="rId24"/>
-    <p:sldId id="286" r:id="rId25"/>
-    <p:sldId id="284" r:id="rId26"/>
-    <p:sldId id="283" r:id="rId27"/>
+    <p:sldId id="287" r:id="rId18"/>
+    <p:sldId id="274" r:id="rId19"/>
+    <p:sldId id="269" r:id="rId20"/>
+    <p:sldId id="270" r:id="rId21"/>
+    <p:sldId id="282" r:id="rId22"/>
+    <p:sldId id="281" r:id="rId23"/>
+    <p:sldId id="261" r:id="rId24"/>
+    <p:sldId id="285" r:id="rId25"/>
+    <p:sldId id="286" r:id="rId26"/>
+    <p:sldId id="284" r:id="rId27"/>
+    <p:sldId id="283" r:id="rId28"/>
   </p:sldIdLst>
   <p:sldSz cx="12192000" cy="6858000"/>
   <p:notesSz cx="6858000" cy="9144000"/>
@@ -145,7 +146,7 @@
             <a:srgbClr val="A4A3A4"/>
           </p15:clr>
         </p15:guide>
-        <p15:guide id="3" orient="horz" pos="3748" userDrawn="1">
+        <p15:guide id="3" orient="horz" pos="3770" userDrawn="1">
           <p15:clr>
             <a:srgbClr val="A4A3A4"/>
           </p15:clr>
@@ -238,7 +239,7 @@
           <a:p>
             <a:fld id="{5C93CA8F-50F8-44B5-B48F-4C4452AC4FCB}" type="datetimeFigureOut">
               <a:rPr lang="he-IL" smtClean="0"/>
-              <a:t>י"ד/אלול/תשע"ט</a:t>
+              <a:t>י"ט/כסלו/תש"פ</a:t>
             </a:fld>
             <a:endParaRPr lang="he-IL"/>
           </a:p>
@@ -1637,7 +1638,7 @@
           <a:p>
             <a:fld id="{C4276747-8356-4D8F-84BF-3C530C5DAF39}" type="slidenum">
               <a:rPr lang="he-IL" smtClean="0"/>
-              <a:t>21</a:t>
+              <a:t>22</a:t>
             </a:fld>
             <a:endParaRPr lang="he-IL"/>
           </a:p>
@@ -2111,7 +2112,7 @@
           <a:p>
             <a:fld id="{C4276747-8356-4D8F-84BF-3C530C5DAF39}" type="slidenum">
               <a:rPr lang="he-IL" smtClean="0"/>
-              <a:t>22</a:t>
+              <a:t>23</a:t>
             </a:fld>
             <a:endParaRPr lang="he-IL"/>
           </a:p>
@@ -2534,7 +2535,7 @@
           <a:p>
             <a:fld id="{808B8BE7-FA93-462E-91E9-54E26C408D98}" type="datetime6">
               <a:rPr lang="en-US" smtClean="0"/>
-              <a:t>September 19</a:t>
+              <a:t>December 19</a:t>
             </a:fld>
             <a:endParaRPr lang="en-US" dirty="0"/>
           </a:p>
@@ -2767,7 +2768,7 @@
           <a:p>
             <a:fld id="{0D82CCDA-FC2D-4BA5-90E3-739DC6ED4C30}" type="datetime6">
               <a:rPr lang="en-US" smtClean="0"/>
-              <a:t>September 19</a:t>
+              <a:t>December 19</a:t>
             </a:fld>
             <a:endParaRPr lang="en-US" dirty="0"/>
           </a:p>
@@ -2946,7 +2947,7 @@
           <a:p>
             <a:fld id="{8F88DA83-5073-4626-B6B8-E91A24F45A53}" type="datetime6">
               <a:rPr lang="en-US" smtClean="0"/>
-              <a:t>September 19</a:t>
+              <a:t>December 19</a:t>
             </a:fld>
             <a:endParaRPr lang="en-US" dirty="0"/>
           </a:p>
@@ -3115,7 +3116,7 @@
           <a:p>
             <a:fld id="{EEBDCC4F-2BAB-4EBD-BBEA-01B8D436681A}" type="datetime6">
               <a:rPr lang="en-US" smtClean="0"/>
-              <a:t>September 19</a:t>
+              <a:t>December 19</a:t>
             </a:fld>
             <a:endParaRPr lang="en-US" dirty="0"/>
           </a:p>
@@ -3439,7 +3440,7 @@
           <a:p>
             <a:fld id="{79487F88-0456-4CDE-8B89-4A78647F618A}" type="datetime6">
               <a:rPr lang="en-US" smtClean="0"/>
-              <a:t>September 19</a:t>
+              <a:t>December 19</a:t>
             </a:fld>
             <a:endParaRPr lang="en-US" dirty="0"/>
           </a:p>
@@ -3889,7 +3890,7 @@
           <a:p>
             <a:fld id="{9136D32D-E4FB-4AA6-8422-EE667E33FFC1}" type="datetime6">
               <a:rPr lang="en-US" smtClean="0"/>
-              <a:t>September 19</a:t>
+              <a:t>December 19</a:t>
             </a:fld>
             <a:endParaRPr lang="en-US" dirty="0"/>
           </a:p>
@@ -4322,7 +4323,7 @@
           <a:p>
             <a:fld id="{3AB3EC8A-F822-46B6-826B-CC266009A74B}" type="datetime6">
               <a:rPr lang="en-US" smtClean="0"/>
-              <a:t>September 19</a:t>
+              <a:t>December 19</a:t>
             </a:fld>
             <a:endParaRPr lang="en-US" dirty="0"/>
           </a:p>
@@ -4439,7 +4440,7 @@
           <a:p>
             <a:fld id="{514A54EB-9E75-485B-93FC-08837C33F6A9}" type="datetime6">
               <a:rPr lang="en-US" smtClean="0"/>
-              <a:t>September 19</a:t>
+              <a:t>December 19</a:t>
             </a:fld>
             <a:endParaRPr lang="en-US" dirty="0"/>
           </a:p>
@@ -4533,7 +4534,7 @@
           <a:p>
             <a:fld id="{4187F57E-3EB2-4425-B7C6-E80F41215C16}" type="datetime6">
               <a:rPr lang="en-US" smtClean="0"/>
-              <a:t>September 19</a:t>
+              <a:t>December 19</a:t>
             </a:fld>
             <a:endParaRPr lang="en-US" dirty="0"/>
           </a:p>
@@ -4882,7 +4883,7 @@
           <a:p>
             <a:fld id="{C0AA945B-18EE-4367-BA0C-8D19048BCABE}" type="datetime6">
               <a:rPr lang="en-US" smtClean="0"/>
-              <a:t>September 19</a:t>
+              <a:t>December 19</a:t>
             </a:fld>
             <a:endParaRPr lang="en-US" dirty="0"/>
           </a:p>
@@ -5370,7 +5371,7 @@
           <a:p>
             <a:fld id="{F5D71FBB-8CD4-4D0A-B8C4-65C60609C705}" type="datetime6">
               <a:rPr lang="en-US" smtClean="0"/>
-              <a:t>September 19</a:t>
+              <a:t>December 19</a:t>
             </a:fld>
             <a:endParaRPr lang="en-US" dirty="0"/>
           </a:p>
@@ -5701,7 +5702,7 @@
           <a:p>
             <a:fld id="{CB7DA022-A739-4269-87CF-EB9B0BE787C4}" type="datetime6">
               <a:rPr lang="en-US" smtClean="0"/>
-              <a:t>September 19</a:t>
+              <a:t>December 19</a:t>
             </a:fld>
             <a:endParaRPr lang="en-US" dirty="0"/>
           </a:p>
@@ -6356,8 +6357,12 @@
           <a:lstStyle/>
           <a:p>
             <a:r>
+              <a:rPr lang="en-US"/>
+              <a:t>December </a:t>
+            </a:r>
+            <a:r>
               <a:rPr lang="en-US" dirty="0"/>
-              <a:t>July 2019</a:t>
+              <a:t>2019</a:t>
             </a:r>
             <a:endParaRPr lang="he-IL" dirty="0"/>
           </a:p>
@@ -8539,6 +8544,186 @@
 </file>
 
 <file path=ppt/slides/slide17.xml><?xml version="1.0" encoding="utf-8"?>
+<p:sld xmlns:a="http://schemas.openxmlformats.org/drawingml/2006/main" xmlns:r="http://schemas.openxmlformats.org/officeDocument/2006/relationships" xmlns:p="http://schemas.openxmlformats.org/presentationml/2006/main">
+  <p:cSld>
+    <p:spTree>
+      <p:nvGrpSpPr>
+        <p:cNvPr id="1" name=""/>
+        <p:cNvGrpSpPr/>
+        <p:nvPr/>
+      </p:nvGrpSpPr>
+      <p:grpSpPr>
+        <a:xfrm>
+          <a:off x="0" y="0"/>
+          <a:ext cx="0" cy="0"/>
+          <a:chOff x="0" y="0"/>
+          <a:chExt cx="0" cy="0"/>
+        </a:xfrm>
+      </p:grpSpPr>
+      <p:sp>
+        <p:nvSpPr>
+          <p:cNvPr id="2" name="Title 1">
+            <a:extLst>
+              <a:ext uri="{FF2B5EF4-FFF2-40B4-BE49-F238E27FC236}">
+                <a16:creationId xmlns:a16="http://schemas.microsoft.com/office/drawing/2014/main" id="{5FF52B76-456D-49C7-8D51-F57142338F11}"/>
+              </a:ext>
+            </a:extLst>
+          </p:cNvPr>
+          <p:cNvSpPr>
+            <a:spLocks noGrp="1"/>
+          </p:cNvSpPr>
+          <p:nvPr>
+            <p:ph type="title"/>
+          </p:nvPr>
+        </p:nvSpPr>
+        <p:spPr/>
+        <p:txBody>
+          <a:bodyPr/>
+          <a:lstStyle/>
+          <a:p>
+            <a:r>
+              <a:rPr lang="en-US" dirty="0"/>
+              <a:t>Exercise – </a:t>
+            </a:r>
+            <a:r>
+              <a:rPr lang="en-US"/>
+              <a:t>Diamond prices</a:t>
+            </a:r>
+            <a:endParaRPr lang="en-IL" dirty="0"/>
+          </a:p>
+        </p:txBody>
+      </p:sp>
+      <p:sp>
+        <p:nvSpPr>
+          <p:cNvPr id="3" name="Content Placeholder 2">
+            <a:extLst>
+              <a:ext uri="{FF2B5EF4-FFF2-40B4-BE49-F238E27FC236}">
+                <a16:creationId xmlns:a16="http://schemas.microsoft.com/office/drawing/2014/main" id="{758E612C-C07A-4F9F-A56B-5CA84ADFCA55}"/>
+              </a:ext>
+            </a:extLst>
+          </p:cNvPr>
+          <p:cNvSpPr>
+            <a:spLocks noGrp="1"/>
+          </p:cNvSpPr>
+          <p:nvPr>
+            <p:ph idx="1"/>
+          </p:nvPr>
+        </p:nvSpPr>
+        <p:spPr/>
+        <p:txBody>
+          <a:bodyPr/>
+          <a:lstStyle/>
+          <a:p>
+            <a:r>
+              <a:rPr lang="en-US" dirty="0"/>
+              <a:t>Use linear regression to build a model for diamond’s prices</a:t>
+            </a:r>
+          </a:p>
+          <a:p>
+            <a:r>
+              <a:rPr lang="en-US" dirty="0"/>
+              <a:t>(Use the data set diamonds from ggplot2)</a:t>
+            </a:r>
+          </a:p>
+          <a:p>
+            <a:r>
+              <a:rPr lang="en-US" dirty="0"/>
+              <a:t>Start by loading the package and familiarizing yourself with the data set</a:t>
+            </a:r>
+          </a:p>
+          <a:p>
+            <a:r>
+              <a:rPr lang="en-US" dirty="0"/>
+              <a:t>Use visualizations to see the relationship of various variables to price</a:t>
+            </a:r>
+          </a:p>
+          <a:p>
+            <a:r>
+              <a:rPr lang="en-US" dirty="0"/>
+              <a:t>Consider using `step` for variable selection</a:t>
+            </a:r>
+          </a:p>
+          <a:p>
+            <a:r>
+              <a:rPr lang="en-US" dirty="0"/>
+              <a:t>Consider various transformations (e.g., `log`) on key variables</a:t>
+            </a:r>
+            <a:endParaRPr lang="en-IL" dirty="0"/>
+          </a:p>
+        </p:txBody>
+      </p:sp>
+      <p:sp>
+        <p:nvSpPr>
+          <p:cNvPr id="4" name="Footer Placeholder 3">
+            <a:extLst>
+              <a:ext uri="{FF2B5EF4-FFF2-40B4-BE49-F238E27FC236}">
+                <a16:creationId xmlns:a16="http://schemas.microsoft.com/office/drawing/2014/main" id="{1EC0D7C7-04D3-4652-A1A1-26169B07152F}"/>
+              </a:ext>
+            </a:extLst>
+          </p:cNvPr>
+          <p:cNvSpPr>
+            <a:spLocks noGrp="1"/>
+          </p:cNvSpPr>
+          <p:nvPr>
+            <p:ph type="ftr" sz="quarter" idx="11"/>
+          </p:nvPr>
+        </p:nvSpPr>
+        <p:spPr/>
+        <p:txBody>
+          <a:bodyPr/>
+          <a:lstStyle/>
+          <a:p>
+            <a:r>
+              <a:rPr lang="en-US"/>
+              <a:t>Materials by Adi Sarid https://adisarid.github.io and http://www.sarid-ins.com</a:t>
+            </a:r>
+            <a:endParaRPr lang="en-US" dirty="0"/>
+          </a:p>
+        </p:txBody>
+      </p:sp>
+      <p:sp>
+        <p:nvSpPr>
+          <p:cNvPr id="5" name="Slide Number Placeholder 4">
+            <a:extLst>
+              <a:ext uri="{FF2B5EF4-FFF2-40B4-BE49-F238E27FC236}">
+                <a16:creationId xmlns:a16="http://schemas.microsoft.com/office/drawing/2014/main" id="{5DC85C0E-6543-4405-8979-C32C770DB450}"/>
+              </a:ext>
+            </a:extLst>
+          </p:cNvPr>
+          <p:cNvSpPr>
+            <a:spLocks noGrp="1"/>
+          </p:cNvSpPr>
+          <p:nvPr>
+            <p:ph type="sldNum" sz="quarter" idx="12"/>
+          </p:nvPr>
+        </p:nvSpPr>
+        <p:spPr/>
+        <p:txBody>
+          <a:bodyPr/>
+          <a:lstStyle/>
+          <a:p>
+            <a:fld id="{4FAB73BC-B049-4115-A692-8D63A059BFB8}" type="slidenum">
+              <a:rPr lang="en-US" smtClean="0"/>
+              <a:t>17</a:t>
+            </a:fld>
+            <a:endParaRPr lang="en-US" dirty="0"/>
+          </a:p>
+        </p:txBody>
+      </p:sp>
+    </p:spTree>
+    <p:extLst>
+      <p:ext uri="{BB962C8B-B14F-4D97-AF65-F5344CB8AC3E}">
+        <p14:creationId xmlns:p14="http://schemas.microsoft.com/office/powerpoint/2010/main" val="1838645892"/>
+      </p:ext>
+    </p:extLst>
+  </p:cSld>
+  <p:clrMapOvr>
+    <a:masterClrMapping/>
+  </p:clrMapOvr>
+</p:sld>
+</file>
+
+<file path=ppt/slides/slide18.xml><?xml version="1.0" encoding="utf-8"?>
 <p:sld xmlns:a="http://schemas.openxmlformats.org/drawingml/2006/main" xmlns:r="http://schemas.openxmlformats.org/officeDocument/2006/relationships" xmlns:p="http://schemas.openxmlformats.org/presentationml/2006/main">
   <p:cSld>
     <p:spTree>
@@ -9151,7 +9336,7 @@
           <a:p>
             <a:fld id="{4FAB73BC-B049-4115-A692-8D63A059BFB8}" type="slidenum">
               <a:rPr lang="en-US" smtClean="0"/>
-              <a:t>17</a:t>
+              <a:t>18</a:t>
             </a:fld>
             <a:endParaRPr lang="en-US" dirty="0"/>
           </a:p>
@@ -9170,7 +9355,7 @@
 </p:sld>
 </file>
 
-<file path=ppt/slides/slide18.xml><?xml version="1.0" encoding="utf-8"?>
+<file path=ppt/slides/slide19.xml><?xml version="1.0" encoding="utf-8"?>
 <p:sld xmlns:a="http://schemas.openxmlformats.org/drawingml/2006/main" xmlns:r="http://schemas.openxmlformats.org/officeDocument/2006/relationships" xmlns:p="http://schemas.openxmlformats.org/presentationml/2006/main">
   <p:cSld>
     <p:spTree>
@@ -9250,7 +9435,7 @@
           <a:p>
             <a:fld id="{4FAB73BC-B049-4115-A692-8D63A059BFB8}" type="slidenum">
               <a:rPr lang="en-US" smtClean="0"/>
-              <a:t>18</a:t>
+              <a:t>19</a:t>
             </a:fld>
             <a:endParaRPr lang="en-US" dirty="0"/>
           </a:p>
@@ -10463,151 +10648,6 @@
 </p:sld>
 </file>
 
-<file path=ppt/slides/slide19.xml><?xml version="1.0" encoding="utf-8"?>
-<p:sld xmlns:a="http://schemas.openxmlformats.org/drawingml/2006/main" xmlns:r="http://schemas.openxmlformats.org/officeDocument/2006/relationships" xmlns:p="http://schemas.openxmlformats.org/presentationml/2006/main">
-  <p:cSld>
-    <p:spTree>
-      <p:nvGrpSpPr>
-        <p:cNvPr id="1" name=""/>
-        <p:cNvGrpSpPr/>
-        <p:nvPr/>
-      </p:nvGrpSpPr>
-      <p:grpSpPr>
-        <a:xfrm>
-          <a:off x="0" y="0"/>
-          <a:ext cx="0" cy="0"/>
-          <a:chOff x="0" y="0"/>
-          <a:chExt cx="0" cy="0"/>
-        </a:xfrm>
-      </p:grpSpPr>
-      <p:sp>
-        <p:nvSpPr>
-          <p:cNvPr id="2" name="Title 1"/>
-          <p:cNvSpPr>
-            <a:spLocks noGrp="1"/>
-          </p:cNvSpPr>
-          <p:nvPr>
-            <p:ph type="title"/>
-          </p:nvPr>
-        </p:nvSpPr>
-        <p:spPr/>
-        <p:txBody>
-          <a:bodyPr>
-            <a:normAutofit fontScale="90000"/>
-          </a:bodyPr>
-          <a:lstStyle/>
-          <a:p>
-            <a:r>
-              <a:rPr lang="en-US" dirty="0"/>
-              <a:t>Dimension reduction using Principle Component Analysis (PCA)</a:t>
-            </a:r>
-            <a:endParaRPr lang="he-IL" dirty="0"/>
-          </a:p>
-        </p:txBody>
-      </p:sp>
-      <p:sp>
-        <p:nvSpPr>
-          <p:cNvPr id="3" name="Content Placeholder 2"/>
-          <p:cNvSpPr>
-            <a:spLocks noGrp="1"/>
-          </p:cNvSpPr>
-          <p:nvPr>
-            <p:ph idx="1"/>
-          </p:nvPr>
-        </p:nvSpPr>
-        <p:spPr/>
-        <p:txBody>
-          <a:bodyPr/>
-          <a:lstStyle/>
-          <a:p>
-            <a:r>
-              <a:rPr lang="en-US" dirty="0"/>
-              <a:t>Sometimes our explanatory variables are correlated</a:t>
-            </a:r>
-          </a:p>
-          <a:p>
-            <a:r>
-              <a:rPr lang="en-US" dirty="0"/>
-              <a:t>We may also get too many variables</a:t>
-            </a:r>
-          </a:p>
-          <a:p>
-            <a:r>
-              <a:rPr lang="en-US" dirty="0"/>
-              <a:t>As discussed, feature selection is one option, another options is PCA</a:t>
-            </a:r>
-          </a:p>
-          <a:p>
-            <a:endParaRPr lang="en-US" dirty="0"/>
-          </a:p>
-          <a:p>
-            <a:r>
-              <a:rPr lang="en-US" dirty="0"/>
-              <a:t>/class code/01-pca.Rmd</a:t>
-            </a:r>
-            <a:endParaRPr lang="he-IL" dirty="0"/>
-          </a:p>
-        </p:txBody>
-      </p:sp>
-      <p:sp>
-        <p:nvSpPr>
-          <p:cNvPr id="4" name="Footer Placeholder 3"/>
-          <p:cNvSpPr>
-            <a:spLocks noGrp="1"/>
-          </p:cNvSpPr>
-          <p:nvPr>
-            <p:ph type="ftr" sz="quarter" idx="11"/>
-          </p:nvPr>
-        </p:nvSpPr>
-        <p:spPr/>
-        <p:txBody>
-          <a:bodyPr/>
-          <a:lstStyle/>
-          <a:p>
-            <a:r>
-              <a:rPr lang="en-US"/>
-              <a:t>Materials by Adi Sarid https://adisarid.github.io and http://www.sarid-ins.com</a:t>
-            </a:r>
-            <a:endParaRPr lang="en-US" dirty="0"/>
-          </a:p>
-        </p:txBody>
-      </p:sp>
-      <p:sp>
-        <p:nvSpPr>
-          <p:cNvPr id="5" name="Slide Number Placeholder 4"/>
-          <p:cNvSpPr>
-            <a:spLocks noGrp="1"/>
-          </p:cNvSpPr>
-          <p:nvPr>
-            <p:ph type="sldNum" sz="quarter" idx="12"/>
-          </p:nvPr>
-        </p:nvSpPr>
-        <p:spPr/>
-        <p:txBody>
-          <a:bodyPr/>
-          <a:lstStyle/>
-          <a:p>
-            <a:fld id="{4FAB73BC-B049-4115-A692-8D63A059BFB8}" type="slidenum">
-              <a:rPr lang="en-US" smtClean="0"/>
-              <a:t>19</a:t>
-            </a:fld>
-            <a:endParaRPr lang="en-US" dirty="0"/>
-          </a:p>
-        </p:txBody>
-      </p:sp>
-    </p:spTree>
-    <p:extLst>
-      <p:ext uri="{BB962C8B-B14F-4D97-AF65-F5344CB8AC3E}">
-        <p14:creationId xmlns:p14="http://schemas.microsoft.com/office/powerpoint/2010/main" val="2763858504"/>
-      </p:ext>
-    </p:extLst>
-  </p:cSld>
-  <p:clrMapOvr>
-    <a:masterClrMapping/>
-  </p:clrMapOvr>
-</p:sld>
-</file>
-
 <file path=ppt/slides/slide2.xml><?xml version="1.0" encoding="utf-8"?>
 <p:sld xmlns:a="http://schemas.openxmlformats.org/drawingml/2006/main" xmlns:r="http://schemas.openxmlformats.org/officeDocument/2006/relationships" xmlns:p="http://schemas.openxmlformats.org/presentationml/2006/main">
   <p:cSld>
@@ -11933,6 +11973,151 @@
       </p:grpSpPr>
       <p:sp>
         <p:nvSpPr>
+          <p:cNvPr id="2" name="Title 1"/>
+          <p:cNvSpPr>
+            <a:spLocks noGrp="1"/>
+          </p:cNvSpPr>
+          <p:nvPr>
+            <p:ph type="title"/>
+          </p:nvPr>
+        </p:nvSpPr>
+        <p:spPr/>
+        <p:txBody>
+          <a:bodyPr>
+            <a:normAutofit fontScale="90000"/>
+          </a:bodyPr>
+          <a:lstStyle/>
+          <a:p>
+            <a:r>
+              <a:rPr lang="en-US" dirty="0"/>
+              <a:t>Dimension reduction using Principle Component Analysis (PCA)</a:t>
+            </a:r>
+            <a:endParaRPr lang="he-IL" dirty="0"/>
+          </a:p>
+        </p:txBody>
+      </p:sp>
+      <p:sp>
+        <p:nvSpPr>
+          <p:cNvPr id="3" name="Content Placeholder 2"/>
+          <p:cNvSpPr>
+            <a:spLocks noGrp="1"/>
+          </p:cNvSpPr>
+          <p:nvPr>
+            <p:ph idx="1"/>
+          </p:nvPr>
+        </p:nvSpPr>
+        <p:spPr/>
+        <p:txBody>
+          <a:bodyPr/>
+          <a:lstStyle/>
+          <a:p>
+            <a:r>
+              <a:rPr lang="en-US" dirty="0"/>
+              <a:t>Sometimes our explanatory variables are correlated</a:t>
+            </a:r>
+          </a:p>
+          <a:p>
+            <a:r>
+              <a:rPr lang="en-US" dirty="0"/>
+              <a:t>We may also get too many variables</a:t>
+            </a:r>
+          </a:p>
+          <a:p>
+            <a:r>
+              <a:rPr lang="en-US" dirty="0"/>
+              <a:t>As discussed, feature selection is one option, another options is PCA</a:t>
+            </a:r>
+          </a:p>
+          <a:p>
+            <a:endParaRPr lang="en-US" dirty="0"/>
+          </a:p>
+          <a:p>
+            <a:r>
+              <a:rPr lang="en-US" dirty="0"/>
+              <a:t>/class code/01-pca.Rmd</a:t>
+            </a:r>
+            <a:endParaRPr lang="he-IL" dirty="0"/>
+          </a:p>
+        </p:txBody>
+      </p:sp>
+      <p:sp>
+        <p:nvSpPr>
+          <p:cNvPr id="4" name="Footer Placeholder 3"/>
+          <p:cNvSpPr>
+            <a:spLocks noGrp="1"/>
+          </p:cNvSpPr>
+          <p:nvPr>
+            <p:ph type="ftr" sz="quarter" idx="11"/>
+          </p:nvPr>
+        </p:nvSpPr>
+        <p:spPr/>
+        <p:txBody>
+          <a:bodyPr/>
+          <a:lstStyle/>
+          <a:p>
+            <a:r>
+              <a:rPr lang="en-US"/>
+              <a:t>Materials by Adi Sarid https://adisarid.github.io and http://www.sarid-ins.com</a:t>
+            </a:r>
+            <a:endParaRPr lang="en-US" dirty="0"/>
+          </a:p>
+        </p:txBody>
+      </p:sp>
+      <p:sp>
+        <p:nvSpPr>
+          <p:cNvPr id="5" name="Slide Number Placeholder 4"/>
+          <p:cNvSpPr>
+            <a:spLocks noGrp="1"/>
+          </p:cNvSpPr>
+          <p:nvPr>
+            <p:ph type="sldNum" sz="quarter" idx="12"/>
+          </p:nvPr>
+        </p:nvSpPr>
+        <p:spPr/>
+        <p:txBody>
+          <a:bodyPr/>
+          <a:lstStyle/>
+          <a:p>
+            <a:fld id="{4FAB73BC-B049-4115-A692-8D63A059BFB8}" type="slidenum">
+              <a:rPr lang="en-US" smtClean="0"/>
+              <a:t>20</a:t>
+            </a:fld>
+            <a:endParaRPr lang="en-US" dirty="0"/>
+          </a:p>
+        </p:txBody>
+      </p:sp>
+    </p:spTree>
+    <p:extLst>
+      <p:ext uri="{BB962C8B-B14F-4D97-AF65-F5344CB8AC3E}">
+        <p14:creationId xmlns:p14="http://schemas.microsoft.com/office/powerpoint/2010/main" val="2763858504"/>
+      </p:ext>
+    </p:extLst>
+  </p:cSld>
+  <p:clrMapOvr>
+    <a:masterClrMapping/>
+  </p:clrMapOvr>
+</p:sld>
+</file>
+
+<file path=ppt/slides/slide21.xml><?xml version="1.0" encoding="utf-8"?>
+<p:sld xmlns:a="http://schemas.openxmlformats.org/drawingml/2006/main" xmlns:r="http://schemas.openxmlformats.org/officeDocument/2006/relationships" xmlns:p="http://schemas.openxmlformats.org/presentationml/2006/main">
+  <p:cSld>
+    <p:spTree>
+      <p:nvGrpSpPr>
+        <p:cNvPr id="1" name=""/>
+        <p:cNvGrpSpPr/>
+        <p:nvPr/>
+      </p:nvGrpSpPr>
+      <p:grpSpPr>
+        <a:xfrm>
+          <a:off x="0" y="0"/>
+          <a:ext cx="0" cy="0"/>
+          <a:chOff x="0" y="0"/>
+          <a:chExt cx="0" cy="0"/>
+        </a:xfrm>
+      </p:grpSpPr>
+      <p:sp>
+        <p:nvSpPr>
           <p:cNvPr id="2" name="Title 1">
             <a:extLst>
               <a:ext uri="{FF2B5EF4-FFF2-40B4-BE49-F238E27FC236}">
@@ -12098,7 +12283,7 @@
           <a:p>
             <a:fld id="{4FAB73BC-B049-4115-A692-8D63A059BFB8}" type="slidenum">
               <a:rPr lang="en-US" smtClean="0"/>
-              <a:t>20</a:t>
+              <a:t>21</a:t>
             </a:fld>
             <a:endParaRPr lang="en-US" dirty="0"/>
           </a:p>
@@ -12117,7 +12302,7 @@
 </p:sld>
 </file>
 
-<file path=ppt/slides/slide21.xml><?xml version="1.0" encoding="utf-8"?>
+<file path=ppt/slides/slide22.xml><?xml version="1.0" encoding="utf-8"?>
 <p:sld xmlns:a="http://schemas.openxmlformats.org/drawingml/2006/main" xmlns:r="http://schemas.openxmlformats.org/officeDocument/2006/relationships" xmlns:p="http://schemas.openxmlformats.org/presentationml/2006/main">
   <p:cSld>
     <p:spTree>
@@ -13032,7 +13217,7 @@
           <a:p>
             <a:fld id="{4FAB73BC-B049-4115-A692-8D63A059BFB8}" type="slidenum">
               <a:rPr lang="en-US" smtClean="0"/>
-              <a:t>21</a:t>
+              <a:t>22</a:t>
             </a:fld>
             <a:endParaRPr lang="en-US" dirty="0"/>
           </a:p>
@@ -13280,7 +13465,7 @@
 </p:sld>
 </file>
 
-<file path=ppt/slides/slide22.xml><?xml version="1.0" encoding="utf-8"?>
+<file path=ppt/slides/slide23.xml><?xml version="1.0" encoding="utf-8"?>
 <p:sld xmlns:a="http://schemas.openxmlformats.org/drawingml/2006/main" xmlns:r="http://schemas.openxmlformats.org/officeDocument/2006/relationships" xmlns:p="http://schemas.openxmlformats.org/presentationml/2006/main">
   <p:cSld>
     <p:spTree>
@@ -13560,7 +13745,7 @@
           <a:p>
             <a:fld id="{4FAB73BC-B049-4115-A692-8D63A059BFB8}" type="slidenum">
               <a:rPr lang="en-US" smtClean="0"/>
-              <a:t>22</a:t>
+              <a:t>23</a:t>
             </a:fld>
             <a:endParaRPr lang="en-US" dirty="0"/>
           </a:p>
@@ -13579,7 +13764,7 @@
 </p:sld>
 </file>
 
-<file path=ppt/slides/slide23.xml><?xml version="1.0" encoding="utf-8"?>
+<file path=ppt/slides/slide24.xml><?xml version="1.0" encoding="utf-8"?>
 <p:sld xmlns:a="http://schemas.openxmlformats.org/drawingml/2006/main" xmlns:r="http://schemas.openxmlformats.org/officeDocument/2006/relationships" xmlns:p="http://schemas.openxmlformats.org/presentationml/2006/main">
   <p:cSld>
     <p:spTree>
@@ -14264,7 +14449,7 @@
           <a:p>
             <a:fld id="{4FAB73BC-B049-4115-A692-8D63A059BFB8}" type="slidenum">
               <a:rPr lang="en-US" smtClean="0"/>
-              <a:t>23</a:t>
+              <a:t>24</a:t>
             </a:fld>
             <a:endParaRPr lang="en-US" dirty="0"/>
           </a:p>
@@ -14472,128 +14657,6 @@
 </p:sld>
 </file>
 
-<file path=ppt/slides/slide24.xml><?xml version="1.0" encoding="utf-8"?>
-<p:sld xmlns:a="http://schemas.openxmlformats.org/drawingml/2006/main" xmlns:r="http://schemas.openxmlformats.org/officeDocument/2006/relationships" xmlns:p="http://schemas.openxmlformats.org/presentationml/2006/main">
-  <p:cSld>
-    <p:spTree>
-      <p:nvGrpSpPr>
-        <p:cNvPr id="1" name=""/>
-        <p:cNvGrpSpPr/>
-        <p:nvPr/>
-      </p:nvGrpSpPr>
-      <p:grpSpPr>
-        <a:xfrm>
-          <a:off x="0" y="0"/>
-          <a:ext cx="0" cy="0"/>
-          <a:chOff x="0" y="0"/>
-          <a:chExt cx="0" cy="0"/>
-        </a:xfrm>
-      </p:grpSpPr>
-      <p:sp>
-        <p:nvSpPr>
-          <p:cNvPr id="2" name="Title 1"/>
-          <p:cNvSpPr>
-            <a:spLocks noGrp="1"/>
-          </p:cNvSpPr>
-          <p:nvPr>
-            <p:ph type="title"/>
-          </p:nvPr>
-        </p:nvSpPr>
-        <p:spPr/>
-        <p:txBody>
-          <a:bodyPr/>
-          <a:lstStyle/>
-          <a:p>
-            <a:r>
-              <a:rPr lang="en-US" dirty="0"/>
-              <a:t>Ridge and Lasso demonstration</a:t>
-            </a:r>
-            <a:endParaRPr lang="he-IL" dirty="0"/>
-          </a:p>
-        </p:txBody>
-      </p:sp>
-      <p:sp>
-        <p:nvSpPr>
-          <p:cNvPr id="7" name="Content Placeholder 6"/>
-          <p:cNvSpPr>
-            <a:spLocks noGrp="1"/>
-          </p:cNvSpPr>
-          <p:nvPr>
-            <p:ph idx="1"/>
-          </p:nvPr>
-        </p:nvSpPr>
-        <p:spPr/>
-        <p:txBody>
-          <a:bodyPr/>
-          <a:lstStyle/>
-          <a:p>
-            <a:r>
-              <a:rPr lang="en-US" dirty="0"/>
-              <a:t>/class code/01-ridge_lasso_glmnet.Rmd</a:t>
-            </a:r>
-            <a:endParaRPr lang="he-IL" dirty="0"/>
-          </a:p>
-        </p:txBody>
-      </p:sp>
-      <p:sp>
-        <p:nvSpPr>
-          <p:cNvPr id="5" name="Footer Placeholder 4"/>
-          <p:cNvSpPr>
-            <a:spLocks noGrp="1"/>
-          </p:cNvSpPr>
-          <p:nvPr>
-            <p:ph type="ftr" sz="quarter" idx="11"/>
-          </p:nvPr>
-        </p:nvSpPr>
-        <p:spPr/>
-        <p:txBody>
-          <a:bodyPr/>
-          <a:lstStyle/>
-          <a:p>
-            <a:r>
-              <a:rPr lang="en-US"/>
-              <a:t>Materials by Adi Sarid https://adisarid.github.io and http://www.sarid-ins.com</a:t>
-            </a:r>
-            <a:endParaRPr lang="en-US" dirty="0"/>
-          </a:p>
-        </p:txBody>
-      </p:sp>
-      <p:sp>
-        <p:nvSpPr>
-          <p:cNvPr id="6" name="Slide Number Placeholder 5"/>
-          <p:cNvSpPr>
-            <a:spLocks noGrp="1"/>
-          </p:cNvSpPr>
-          <p:nvPr>
-            <p:ph type="sldNum" sz="quarter" idx="12"/>
-          </p:nvPr>
-        </p:nvSpPr>
-        <p:spPr/>
-        <p:txBody>
-          <a:bodyPr/>
-          <a:lstStyle/>
-          <a:p>
-            <a:fld id="{4FAB73BC-B049-4115-A692-8D63A059BFB8}" type="slidenum">
-              <a:rPr lang="en-US" smtClean="0"/>
-              <a:t>24</a:t>
-            </a:fld>
-            <a:endParaRPr lang="en-US" dirty="0"/>
-          </a:p>
-        </p:txBody>
-      </p:sp>
-    </p:spTree>
-    <p:extLst>
-      <p:ext uri="{BB962C8B-B14F-4D97-AF65-F5344CB8AC3E}">
-        <p14:creationId xmlns:p14="http://schemas.microsoft.com/office/powerpoint/2010/main" val="1225703325"/>
-      </p:ext>
-    </p:extLst>
-  </p:cSld>
-  <p:clrMapOvr>
-    <a:masterClrMapping/>
-  </p:clrMapOvr>
-</p:sld>
-</file>
-
 <file path=ppt/slides/slide25.xml><?xml version="1.0" encoding="utf-8"?>
 <p:sld xmlns:a="http://schemas.openxmlformats.org/drawingml/2006/main" xmlns:r="http://schemas.openxmlformats.org/officeDocument/2006/relationships" xmlns:p="http://schemas.openxmlformats.org/presentationml/2006/main">
   <p:cSld>
@@ -14628,6 +14691,128 @@
           <a:p>
             <a:r>
               <a:rPr lang="en-US" dirty="0"/>
+              <a:t>Ridge and Lasso demonstration</a:t>
+            </a:r>
+            <a:endParaRPr lang="he-IL" dirty="0"/>
+          </a:p>
+        </p:txBody>
+      </p:sp>
+      <p:sp>
+        <p:nvSpPr>
+          <p:cNvPr id="7" name="Content Placeholder 6"/>
+          <p:cNvSpPr>
+            <a:spLocks noGrp="1"/>
+          </p:cNvSpPr>
+          <p:nvPr>
+            <p:ph idx="1"/>
+          </p:nvPr>
+        </p:nvSpPr>
+        <p:spPr/>
+        <p:txBody>
+          <a:bodyPr/>
+          <a:lstStyle/>
+          <a:p>
+            <a:r>
+              <a:rPr lang="en-US" dirty="0"/>
+              <a:t>/class code/01-ridge_lasso_glmnet.Rmd</a:t>
+            </a:r>
+            <a:endParaRPr lang="he-IL" dirty="0"/>
+          </a:p>
+        </p:txBody>
+      </p:sp>
+      <p:sp>
+        <p:nvSpPr>
+          <p:cNvPr id="5" name="Footer Placeholder 4"/>
+          <p:cNvSpPr>
+            <a:spLocks noGrp="1"/>
+          </p:cNvSpPr>
+          <p:nvPr>
+            <p:ph type="ftr" sz="quarter" idx="11"/>
+          </p:nvPr>
+        </p:nvSpPr>
+        <p:spPr/>
+        <p:txBody>
+          <a:bodyPr/>
+          <a:lstStyle/>
+          <a:p>
+            <a:r>
+              <a:rPr lang="en-US"/>
+              <a:t>Materials by Adi Sarid https://adisarid.github.io and http://www.sarid-ins.com</a:t>
+            </a:r>
+            <a:endParaRPr lang="en-US" dirty="0"/>
+          </a:p>
+        </p:txBody>
+      </p:sp>
+      <p:sp>
+        <p:nvSpPr>
+          <p:cNvPr id="6" name="Slide Number Placeholder 5"/>
+          <p:cNvSpPr>
+            <a:spLocks noGrp="1"/>
+          </p:cNvSpPr>
+          <p:nvPr>
+            <p:ph type="sldNum" sz="quarter" idx="12"/>
+          </p:nvPr>
+        </p:nvSpPr>
+        <p:spPr/>
+        <p:txBody>
+          <a:bodyPr/>
+          <a:lstStyle/>
+          <a:p>
+            <a:fld id="{4FAB73BC-B049-4115-A692-8D63A059BFB8}" type="slidenum">
+              <a:rPr lang="en-US" smtClean="0"/>
+              <a:t>25</a:t>
+            </a:fld>
+            <a:endParaRPr lang="en-US" dirty="0"/>
+          </a:p>
+        </p:txBody>
+      </p:sp>
+    </p:spTree>
+    <p:extLst>
+      <p:ext uri="{BB962C8B-B14F-4D97-AF65-F5344CB8AC3E}">
+        <p14:creationId xmlns:p14="http://schemas.microsoft.com/office/powerpoint/2010/main" val="1225703325"/>
+      </p:ext>
+    </p:extLst>
+  </p:cSld>
+  <p:clrMapOvr>
+    <a:masterClrMapping/>
+  </p:clrMapOvr>
+</p:sld>
+</file>
+
+<file path=ppt/slides/slide26.xml><?xml version="1.0" encoding="utf-8"?>
+<p:sld xmlns:a="http://schemas.openxmlformats.org/drawingml/2006/main" xmlns:r="http://schemas.openxmlformats.org/officeDocument/2006/relationships" xmlns:p="http://schemas.openxmlformats.org/presentationml/2006/main">
+  <p:cSld>
+    <p:spTree>
+      <p:nvGrpSpPr>
+        <p:cNvPr id="1" name=""/>
+        <p:cNvGrpSpPr/>
+        <p:nvPr/>
+      </p:nvGrpSpPr>
+      <p:grpSpPr>
+        <a:xfrm>
+          <a:off x="0" y="0"/>
+          <a:ext cx="0" cy="0"/>
+          <a:chOff x="0" y="0"/>
+          <a:chExt cx="0" cy="0"/>
+        </a:xfrm>
+      </p:grpSpPr>
+      <p:sp>
+        <p:nvSpPr>
+          <p:cNvPr id="2" name="Title 1"/>
+          <p:cNvSpPr>
+            <a:spLocks noGrp="1"/>
+          </p:cNvSpPr>
+          <p:nvPr>
+            <p:ph type="title"/>
+          </p:nvPr>
+        </p:nvSpPr>
+        <p:spPr/>
+        <p:txBody>
+          <a:bodyPr/>
+          <a:lstStyle/>
+          <a:p>
+            <a:r>
+              <a:rPr lang="en-US" dirty="0"/>
               <a:t>Contents</a:t>
             </a:r>
             <a:endParaRPr lang="he-IL" dirty="0"/>
@@ -14674,7 +14859,7 @@
           <a:p>
             <a:fld id="{4FAB73BC-B049-4115-A692-8D63A059BFB8}" type="slidenum">
               <a:rPr lang="en-US" smtClean="0"/>
-              <a:t>25</a:t>
+              <a:t>26</a:t>
             </a:fld>
             <a:endParaRPr lang="en-US" dirty="0"/>
           </a:p>
@@ -15887,7 +16072,7 @@
 </p:sld>
 </file>
 
-<file path=ppt/slides/slide26.xml><?xml version="1.0" encoding="utf-8"?>
+<file path=ppt/slides/slide27.xml><?xml version="1.0" encoding="utf-8"?>
 <p:sld xmlns:a="http://schemas.openxmlformats.org/drawingml/2006/main" xmlns:r="http://schemas.openxmlformats.org/officeDocument/2006/relationships" xmlns:p="http://schemas.openxmlformats.org/presentationml/2006/main">
   <p:cSld>
     <p:spTree>
@@ -16062,7 +16247,7 @@
           <a:p>
             <a:fld id="{4FAB73BC-B049-4115-A692-8D63A059BFB8}" type="slidenum">
               <a:rPr lang="en-US" smtClean="0"/>
-              <a:t>26</a:t>
+              <a:t>27</a:t>
             </a:fld>
             <a:endParaRPr lang="en-US" dirty="0"/>
           </a:p>

</xml_diff>